<commit_message>
Update Marketing Analytics Business Case.pptx
</commit_message>
<xml_diff>
--- a/Marketing Analytics Business Case.pptx
+++ b/Marketing Analytics Business Case.pptx
@@ -117,14 +117,6 @@
 </p:presentation>
 </file>
 
-<file path=ppt/revisionInfo.xml><?xml version="1.0" encoding="utf-8"?>
-<p1510:revInfo xmlns:a="http://schemas.openxmlformats.org/drawingml/2006/main" xmlns:r="http://schemas.openxmlformats.org/officeDocument/2006/relationships" xmlns:p1510="http://schemas.microsoft.com/office/powerpoint/2015/10/main">
-  <p1510:revLst>
-    <p1510:client id="{562C9CDA-06AD-448B-AE43-AF39E35C9415}" v="1" dt="2024-07-21T12:56:05.144"/>
-  </p1510:revLst>
-</p1510:revInfo>
-</file>
-
 <file path=ppt/changesInfos/changesInfo1.xml><?xml version="1.0" encoding="utf-8"?>
 <pc:chgInfo xmlns:a="http://schemas.openxmlformats.org/drawingml/2006/main" xmlns:r="http://schemas.openxmlformats.org/officeDocument/2006/relationships" xmlns:ac="http://schemas.microsoft.com/office/drawing/2013/main/command" xmlns:pc="http://schemas.microsoft.com/office/powerpoint/2013/main/command">
   <pc:docChgLst>
@@ -140,14 +132,6 @@
           <pc:docMk/>
           <pc:sldMk cId="2772807980" sldId="256"/>
         </pc:sldMkLst>
-        <pc:spChg chg="mod">
-          <ac:chgData name="Ali Ahmad" userId="d3510f94-5988-4c3a-9ef9-f2f99b91dc31" providerId="ADAL" clId="{562C9CDA-06AD-448B-AE43-AF39E35C9415}" dt="2024-07-26T16:34:33.157" v="266" actId="20577"/>
-          <ac:spMkLst>
-            <pc:docMk/>
-            <pc:sldMk cId="2772807980" sldId="256"/>
-            <ac:spMk id="3" creationId="{C4EAED8B-40B8-2F67-2CA2-D6CB3B6F8578}"/>
-          </ac:spMkLst>
-        </pc:spChg>
       </pc:sldChg>
       <pc:sldChg chg="modSp mod">
         <pc:chgData name="Ali Ahmad" userId="d3510f94-5988-4c3a-9ef9-f2f99b91dc31" providerId="ADAL" clId="{562C9CDA-06AD-448B-AE43-AF39E35C9415}" dt="2024-07-21T12:56:32.117" v="22" actId="27636"/>
@@ -155,22 +139,6 @@
           <pc:docMk/>
           <pc:sldMk cId="349862419" sldId="258"/>
         </pc:sldMkLst>
-        <pc:spChg chg="mod">
-          <ac:chgData name="Ali Ahmad" userId="d3510f94-5988-4c3a-9ef9-f2f99b91dc31" providerId="ADAL" clId="{562C9CDA-06AD-448B-AE43-AF39E35C9415}" dt="2024-07-20T14:34:31.603" v="11" actId="113"/>
-          <ac:spMkLst>
-            <pc:docMk/>
-            <pc:sldMk cId="349862419" sldId="258"/>
-            <ac:spMk id="2" creationId="{035C383B-F10C-7ECB-AA0D-9A79BD44F6B7}"/>
-          </ac:spMkLst>
-        </pc:spChg>
-        <pc:spChg chg="mod">
-          <ac:chgData name="Ali Ahmad" userId="d3510f94-5988-4c3a-9ef9-f2f99b91dc31" providerId="ADAL" clId="{562C9CDA-06AD-448B-AE43-AF39E35C9415}" dt="2024-07-21T12:56:32.117" v="22" actId="27636"/>
-          <ac:spMkLst>
-            <pc:docMk/>
-            <pc:sldMk cId="349862419" sldId="258"/>
-            <ac:spMk id="3" creationId="{F9AAA8B0-E93B-E9BB-8C09-E2F8D0D61EB5}"/>
-          </ac:spMkLst>
-        </pc:spChg>
       </pc:sldChg>
       <pc:sldChg chg="modSp del mod">
         <pc:chgData name="Ali Ahmad" userId="d3510f94-5988-4c3a-9ef9-f2f99b91dc31" providerId="ADAL" clId="{562C9CDA-06AD-448B-AE43-AF39E35C9415}" dt="2024-07-31T19:06:28.391" v="297" actId="2696"/>
@@ -178,22 +146,6 @@
           <pc:docMk/>
           <pc:sldMk cId="2639771135" sldId="259"/>
         </pc:sldMkLst>
-        <pc:spChg chg="mod">
-          <ac:chgData name="Ali Ahmad" userId="d3510f94-5988-4c3a-9ef9-f2f99b91dc31" providerId="ADAL" clId="{562C9CDA-06AD-448B-AE43-AF39E35C9415}" dt="2024-07-21T18:20:48.487" v="247" actId="113"/>
-          <ac:spMkLst>
-            <pc:docMk/>
-            <pc:sldMk cId="2639771135" sldId="259"/>
-            <ac:spMk id="2" creationId="{72C2B2EC-99A5-254E-1B8F-9051BBBBDDFD}"/>
-          </ac:spMkLst>
-        </pc:spChg>
-        <pc:spChg chg="mod">
-          <ac:chgData name="Ali Ahmad" userId="d3510f94-5988-4c3a-9ef9-f2f99b91dc31" providerId="ADAL" clId="{562C9CDA-06AD-448B-AE43-AF39E35C9415}" dt="2024-07-22T10:52:00.584" v="252" actId="27636"/>
-          <ac:spMkLst>
-            <pc:docMk/>
-            <pc:sldMk cId="2639771135" sldId="259"/>
-            <ac:spMk id="3" creationId="{BE626091-3B69-DCC0-994D-701843DDEA07}"/>
-          </ac:spMkLst>
-        </pc:spChg>
       </pc:sldChg>
       <pc:sldChg chg="modSp mod">
         <pc:chgData name="Ali Ahmad" userId="d3510f94-5988-4c3a-9ef9-f2f99b91dc31" providerId="ADAL" clId="{562C9CDA-06AD-448B-AE43-AF39E35C9415}" dt="2024-07-21T18:20:51.581" v="248" actId="113"/>
@@ -201,22 +153,6 @@
           <pc:docMk/>
           <pc:sldMk cId="3166029343" sldId="260"/>
         </pc:sldMkLst>
-        <pc:spChg chg="mod">
-          <ac:chgData name="Ali Ahmad" userId="d3510f94-5988-4c3a-9ef9-f2f99b91dc31" providerId="ADAL" clId="{562C9CDA-06AD-448B-AE43-AF39E35C9415}" dt="2024-07-21T18:20:51.581" v="248" actId="113"/>
-          <ac:spMkLst>
-            <pc:docMk/>
-            <pc:sldMk cId="3166029343" sldId="260"/>
-            <ac:spMk id="2" creationId="{6F41F449-8457-0E38-E3B4-75FA6F83C166}"/>
-          </ac:spMkLst>
-        </pc:spChg>
-        <pc:spChg chg="mod">
-          <ac:chgData name="Ali Ahmad" userId="d3510f94-5988-4c3a-9ef9-f2f99b91dc31" providerId="ADAL" clId="{562C9CDA-06AD-448B-AE43-AF39E35C9415}" dt="2024-07-21T13:02:38.648" v="56" actId="20577"/>
-          <ac:spMkLst>
-            <pc:docMk/>
-            <pc:sldMk cId="3166029343" sldId="260"/>
-            <ac:spMk id="3" creationId="{A96A4C0A-7CD6-52C8-5795-CE203917B8A2}"/>
-          </ac:spMkLst>
-        </pc:spChg>
       </pc:sldChg>
       <pc:sldChg chg="del">
         <pc:chgData name="Ali Ahmad" userId="d3510f94-5988-4c3a-9ef9-f2f99b91dc31" providerId="ADAL" clId="{562C9CDA-06AD-448B-AE43-AF39E35C9415}" dt="2024-07-21T13:01:33.887" v="29" actId="2696"/>
@@ -231,22 +167,6 @@
           <pc:docMk/>
           <pc:sldMk cId="2564379909" sldId="263"/>
         </pc:sldMkLst>
-        <pc:spChg chg="mod">
-          <ac:chgData name="Ali Ahmad" userId="d3510f94-5988-4c3a-9ef9-f2f99b91dc31" providerId="ADAL" clId="{562C9CDA-06AD-448B-AE43-AF39E35C9415}" dt="2024-07-31T19:05:17.669" v="289" actId="20577"/>
-          <ac:spMkLst>
-            <pc:docMk/>
-            <pc:sldMk cId="2564379909" sldId="263"/>
-            <ac:spMk id="2" creationId="{25E5519D-E5FA-5BA8-A4BA-A225CA110308}"/>
-          </ac:spMkLst>
-        </pc:spChg>
-        <pc:spChg chg="mod">
-          <ac:chgData name="Ali Ahmad" userId="d3510f94-5988-4c3a-9ef9-f2f99b91dc31" providerId="ADAL" clId="{562C9CDA-06AD-448B-AE43-AF39E35C9415}" dt="2024-07-31T19:05:48.602" v="293" actId="13926"/>
-          <ac:spMkLst>
-            <pc:docMk/>
-            <pc:sldMk cId="2564379909" sldId="263"/>
-            <ac:spMk id="3" creationId="{3AACD20F-C850-EB87-7F72-C016CF415169}"/>
-          </ac:spMkLst>
-        </pc:spChg>
       </pc:sldChg>
       <pc:sldChg chg="modSp add del mod">
         <pc:chgData name="Ali Ahmad" userId="d3510f94-5988-4c3a-9ef9-f2f99b91dc31" providerId="ADAL" clId="{562C9CDA-06AD-448B-AE43-AF39E35C9415}" dt="2024-08-04T07:10:34.257" v="303" actId="47"/>
@@ -254,14 +174,6 @@
           <pc:docMk/>
           <pc:sldMk cId="3587581020" sldId="264"/>
         </pc:sldMkLst>
-        <pc:spChg chg="mod">
-          <ac:chgData name="Ali Ahmad" userId="d3510f94-5988-4c3a-9ef9-f2f99b91dc31" providerId="ADAL" clId="{562C9CDA-06AD-448B-AE43-AF39E35C9415}" dt="2024-07-31T19:04:07.624" v="282" actId="13926"/>
-          <ac:spMkLst>
-            <pc:docMk/>
-            <pc:sldMk cId="3587581020" sldId="264"/>
-            <ac:spMk id="5" creationId="{FFB07957-8AEC-E74B-74C4-5935935C9130}"/>
-          </ac:spMkLst>
-        </pc:spChg>
       </pc:sldChg>
       <pc:sldChg chg="modSp add del mod">
         <pc:chgData name="Ali Ahmad" userId="d3510f94-5988-4c3a-9ef9-f2f99b91dc31" providerId="ADAL" clId="{562C9CDA-06AD-448B-AE43-AF39E35C9415}" dt="2024-08-04T07:10:35.296" v="304" actId="47"/>
@@ -269,14 +181,6 @@
           <pc:docMk/>
           <pc:sldMk cId="2996022595" sldId="265"/>
         </pc:sldMkLst>
-        <pc:spChg chg="mod">
-          <ac:chgData name="Ali Ahmad" userId="d3510f94-5988-4c3a-9ef9-f2f99b91dc31" providerId="ADAL" clId="{562C9CDA-06AD-448B-AE43-AF39E35C9415}" dt="2024-08-04T06:59:30.039" v="300" actId="13926"/>
-          <ac:spMkLst>
-            <pc:docMk/>
-            <pc:sldMk cId="2996022595" sldId="265"/>
-            <ac:spMk id="3" creationId="{3AACD20F-C850-EB87-7F72-C016CF415169}"/>
-          </ac:spMkLst>
-        </pc:spChg>
       </pc:sldChg>
       <pc:sldChg chg="add">
         <pc:chgData name="Ali Ahmad" userId="d3510f94-5988-4c3a-9ef9-f2f99b91dc31" providerId="ADAL" clId="{562C9CDA-06AD-448B-AE43-AF39E35C9415}" dt="2024-07-31T19:01:42.643" v="269" actId="2890"/>
@@ -298,14 +202,6 @@
           <pc:docMk/>
           <pc:sldMk cId="891365146" sldId="268"/>
         </pc:sldMkLst>
-        <pc:spChg chg="mod">
-          <ac:chgData name="Ali Ahmad" userId="d3510f94-5988-4c3a-9ef9-f2f99b91dc31" providerId="ADAL" clId="{562C9CDA-06AD-448B-AE43-AF39E35C9415}" dt="2024-08-04T07:04:16.399" v="302" actId="13926"/>
-          <ac:spMkLst>
-            <pc:docMk/>
-            <pc:sldMk cId="891365146" sldId="268"/>
-            <ac:spMk id="3" creationId="{BE626091-3B69-DCC0-994D-701843DDEA07}"/>
-          </ac:spMkLst>
-        </pc:spChg>
       </pc:sldChg>
       <pc:sldChg chg="add del">
         <pc:chgData name="Ali Ahmad" userId="d3510f94-5988-4c3a-9ef9-f2f99b91dc31" providerId="ADAL" clId="{562C9CDA-06AD-448B-AE43-AF39E35C9415}" dt="2024-07-31T19:06:32.545" v="298" actId="2696"/>
@@ -313,6 +209,30 @@
           <pc:docMk/>
           <pc:sldMk cId="749400608" sldId="269"/>
         </pc:sldMkLst>
+      </pc:sldChg>
+    </pc:docChg>
+  </pc:docChgLst>
+  <pc:docChgLst>
+    <pc:chgData name="Akhil Rathod" userId="17304ee975858113" providerId="LiveId" clId="{5C3E7FE8-56BE-42CE-9162-E027BBAFD322}"/>
+    <pc:docChg chg="modSld">
+      <pc:chgData name="Akhil Rathod" userId="17304ee975858113" providerId="LiveId" clId="{5C3E7FE8-56BE-42CE-9162-E027BBAFD322}" dt="2025-02-19T13:06:42.376" v="11" actId="20577"/>
+      <pc:docMkLst>
+        <pc:docMk/>
+      </pc:docMkLst>
+      <pc:sldChg chg="modSp mod">
+        <pc:chgData name="Akhil Rathod" userId="17304ee975858113" providerId="LiveId" clId="{5C3E7FE8-56BE-42CE-9162-E027BBAFD322}" dt="2025-02-19T13:06:42.376" v="11" actId="20577"/>
+        <pc:sldMkLst>
+          <pc:docMk/>
+          <pc:sldMk cId="2772807980" sldId="256"/>
+        </pc:sldMkLst>
+        <pc:spChg chg="mod">
+          <ac:chgData name="Akhil Rathod" userId="17304ee975858113" providerId="LiveId" clId="{5C3E7FE8-56BE-42CE-9162-E027BBAFD322}" dt="2025-02-19T13:06:42.376" v="11" actId="20577"/>
+          <ac:spMkLst>
+            <pc:docMk/>
+            <pc:sldMk cId="2772807980" sldId="256"/>
+            <ac:spMk id="3" creationId="{C4EAED8B-40B8-2F67-2CA2-D6CB3B6F8578}"/>
+          </ac:spMkLst>
+        </pc:spChg>
       </pc:sldChg>
     </pc:docChg>
   </pc:docChgLst>
@@ -468,7 +388,7 @@
           <a:p>
             <a:fld id="{1E4130FF-60BC-4C0C-AEE3-7285F2A694C4}" type="datetimeFigureOut">
               <a:rPr lang="nb-NO" smtClean="0"/>
-              <a:t>04.08.2024</a:t>
+              <a:t>19.02.2025</a:t>
             </a:fld>
             <a:endParaRPr lang="nb-NO"/>
           </a:p>
@@ -668,7 +588,7 @@
           <a:p>
             <a:fld id="{1E4130FF-60BC-4C0C-AEE3-7285F2A694C4}" type="datetimeFigureOut">
               <a:rPr lang="nb-NO" smtClean="0"/>
-              <a:t>04.08.2024</a:t>
+              <a:t>19.02.2025</a:t>
             </a:fld>
             <a:endParaRPr lang="nb-NO"/>
           </a:p>
@@ -878,7 +798,7 @@
           <a:p>
             <a:fld id="{1E4130FF-60BC-4C0C-AEE3-7285F2A694C4}" type="datetimeFigureOut">
               <a:rPr lang="nb-NO" smtClean="0"/>
-              <a:t>04.08.2024</a:t>
+              <a:t>19.02.2025</a:t>
             </a:fld>
             <a:endParaRPr lang="nb-NO"/>
           </a:p>
@@ -1078,7 +998,7 @@
           <a:p>
             <a:fld id="{1E4130FF-60BC-4C0C-AEE3-7285F2A694C4}" type="datetimeFigureOut">
               <a:rPr lang="nb-NO" smtClean="0"/>
-              <a:t>04.08.2024</a:t>
+              <a:t>19.02.2025</a:t>
             </a:fld>
             <a:endParaRPr lang="nb-NO"/>
           </a:p>
@@ -1354,7 +1274,7 @@
           <a:p>
             <a:fld id="{1E4130FF-60BC-4C0C-AEE3-7285F2A694C4}" type="datetimeFigureOut">
               <a:rPr lang="nb-NO" smtClean="0"/>
-              <a:t>04.08.2024</a:t>
+              <a:t>19.02.2025</a:t>
             </a:fld>
             <a:endParaRPr lang="nb-NO"/>
           </a:p>
@@ -1622,7 +1542,7 @@
           <a:p>
             <a:fld id="{1E4130FF-60BC-4C0C-AEE3-7285F2A694C4}" type="datetimeFigureOut">
               <a:rPr lang="nb-NO" smtClean="0"/>
-              <a:t>04.08.2024</a:t>
+              <a:t>19.02.2025</a:t>
             </a:fld>
             <a:endParaRPr lang="nb-NO"/>
           </a:p>
@@ -2037,7 +1957,7 @@
           <a:p>
             <a:fld id="{1E4130FF-60BC-4C0C-AEE3-7285F2A694C4}" type="datetimeFigureOut">
               <a:rPr lang="nb-NO" smtClean="0"/>
-              <a:t>04.08.2024</a:t>
+              <a:t>19.02.2025</a:t>
             </a:fld>
             <a:endParaRPr lang="nb-NO"/>
           </a:p>
@@ -2179,7 +2099,7 @@
           <a:p>
             <a:fld id="{1E4130FF-60BC-4C0C-AEE3-7285F2A694C4}" type="datetimeFigureOut">
               <a:rPr lang="nb-NO" smtClean="0"/>
-              <a:t>04.08.2024</a:t>
+              <a:t>19.02.2025</a:t>
             </a:fld>
             <a:endParaRPr lang="nb-NO"/>
           </a:p>
@@ -2292,7 +2212,7 @@
           <a:p>
             <a:fld id="{1E4130FF-60BC-4C0C-AEE3-7285F2A694C4}" type="datetimeFigureOut">
               <a:rPr lang="nb-NO" smtClean="0"/>
-              <a:t>04.08.2024</a:t>
+              <a:t>19.02.2025</a:t>
             </a:fld>
             <a:endParaRPr lang="nb-NO"/>
           </a:p>
@@ -2605,7 +2525,7 @@
           <a:p>
             <a:fld id="{1E4130FF-60BC-4C0C-AEE3-7285F2A694C4}" type="datetimeFigureOut">
               <a:rPr lang="nb-NO" smtClean="0"/>
-              <a:t>04.08.2024</a:t>
+              <a:t>19.02.2025</a:t>
             </a:fld>
             <a:endParaRPr lang="nb-NO"/>
           </a:p>
@@ -2894,7 +2814,7 @@
           <a:p>
             <a:fld id="{1E4130FF-60BC-4C0C-AEE3-7285F2A694C4}" type="datetimeFigureOut">
               <a:rPr lang="nb-NO" smtClean="0"/>
-              <a:t>04.08.2024</a:t>
+              <a:t>19.02.2025</a:t>
             </a:fld>
             <a:endParaRPr lang="nb-NO"/>
           </a:p>
@@ -3137,7 +3057,7 @@
           <a:p>
             <a:fld id="{1E4130FF-60BC-4C0C-AEE3-7285F2A694C4}" type="datetimeFigureOut">
               <a:rPr lang="nb-NO" smtClean="0"/>
-              <a:t>04.08.2024</a:t>
+              <a:t>19.02.2025</a:t>
             </a:fld>
             <a:endParaRPr lang="nb-NO"/>
           </a:p>
@@ -3605,8 +3525,8 @@
           <a:lstStyle/>
           <a:p>
             <a:r>
-              <a:rPr lang="nb-NO"/>
-              <a:t>Ali Ahmad</a:t>
+              <a:rPr lang="nb-NO" dirty="0"/>
+              <a:t>Akhil Rathod</a:t>
             </a:r>
           </a:p>
           <a:p>

</xml_diff>